<commit_message>
Change figures according to Maximilien's advices
</commit_message>
<xml_diff>
--- a/neopentane_g_and_dens.pptx
+++ b/neopentane_g_and_dens.pptx
@@ -7,14 +7,14 @@
   <p:sldIdLst>
     <p:sldId id="256" r:id="rId2"/>
   </p:sldIdLst>
-  <p:sldSz cx="6858000" cy="9144000" type="screen4x3"/>
+  <p:sldSz cx="9601200" cy="12801600" type="A3"/>
   <p:notesSz cx="6858000" cy="9144000"/>
   <p:defaultTextStyle>
     <a:defPPr>
       <a:defRPr lang="fr-FR"/>
     </a:defPPr>
-    <a:lvl1pPr marL="0" algn="l" defTabSz="457200" rtl="0" eaLnBrk="1" latinLnBrk="0" hangingPunct="1">
-      <a:defRPr sz="1800" kern="1200">
+    <a:lvl1pPr marL="0" algn="l" defTabSz="610956" rtl="0" eaLnBrk="1" latinLnBrk="0" hangingPunct="1">
+      <a:defRPr sz="2400" kern="1200">
         <a:solidFill>
           <a:schemeClr val="tx1"/>
         </a:solidFill>
@@ -23,8 +23,8 @@
         <a:cs typeface="+mn-cs"/>
       </a:defRPr>
     </a:lvl1pPr>
-    <a:lvl2pPr marL="457200" algn="l" defTabSz="457200" rtl="0" eaLnBrk="1" latinLnBrk="0" hangingPunct="1">
-      <a:defRPr sz="1800" kern="1200">
+    <a:lvl2pPr marL="610956" algn="l" defTabSz="610956" rtl="0" eaLnBrk="1" latinLnBrk="0" hangingPunct="1">
+      <a:defRPr sz="2400" kern="1200">
         <a:solidFill>
           <a:schemeClr val="tx1"/>
         </a:solidFill>
@@ -33,8 +33,8 @@
         <a:cs typeface="+mn-cs"/>
       </a:defRPr>
     </a:lvl2pPr>
-    <a:lvl3pPr marL="914400" algn="l" defTabSz="457200" rtl="0" eaLnBrk="1" latinLnBrk="0" hangingPunct="1">
-      <a:defRPr sz="1800" kern="1200">
+    <a:lvl3pPr marL="1221913" algn="l" defTabSz="610956" rtl="0" eaLnBrk="1" latinLnBrk="0" hangingPunct="1">
+      <a:defRPr sz="2400" kern="1200">
         <a:solidFill>
           <a:schemeClr val="tx1"/>
         </a:solidFill>
@@ -43,8 +43,8 @@
         <a:cs typeface="+mn-cs"/>
       </a:defRPr>
     </a:lvl3pPr>
-    <a:lvl4pPr marL="1371600" algn="l" defTabSz="457200" rtl="0" eaLnBrk="1" latinLnBrk="0" hangingPunct="1">
-      <a:defRPr sz="1800" kern="1200">
+    <a:lvl4pPr marL="1832869" algn="l" defTabSz="610956" rtl="0" eaLnBrk="1" latinLnBrk="0" hangingPunct="1">
+      <a:defRPr sz="2400" kern="1200">
         <a:solidFill>
           <a:schemeClr val="tx1"/>
         </a:solidFill>
@@ -53,8 +53,8 @@
         <a:cs typeface="+mn-cs"/>
       </a:defRPr>
     </a:lvl4pPr>
-    <a:lvl5pPr marL="1828800" algn="l" defTabSz="457200" rtl="0" eaLnBrk="1" latinLnBrk="0" hangingPunct="1">
-      <a:defRPr sz="1800" kern="1200">
+    <a:lvl5pPr marL="2443825" algn="l" defTabSz="610956" rtl="0" eaLnBrk="1" latinLnBrk="0" hangingPunct="1">
+      <a:defRPr sz="2400" kern="1200">
         <a:solidFill>
           <a:schemeClr val="tx1"/>
         </a:solidFill>
@@ -63,8 +63,8 @@
         <a:cs typeface="+mn-cs"/>
       </a:defRPr>
     </a:lvl5pPr>
-    <a:lvl6pPr marL="2286000" algn="l" defTabSz="457200" rtl="0" eaLnBrk="1" latinLnBrk="0" hangingPunct="1">
-      <a:defRPr sz="1800" kern="1200">
+    <a:lvl6pPr marL="3054782" algn="l" defTabSz="610956" rtl="0" eaLnBrk="1" latinLnBrk="0" hangingPunct="1">
+      <a:defRPr sz="2400" kern="1200">
         <a:solidFill>
           <a:schemeClr val="tx1"/>
         </a:solidFill>
@@ -73,8 +73,8 @@
         <a:cs typeface="+mn-cs"/>
       </a:defRPr>
     </a:lvl6pPr>
-    <a:lvl7pPr marL="2743200" algn="l" defTabSz="457200" rtl="0" eaLnBrk="1" latinLnBrk="0" hangingPunct="1">
-      <a:defRPr sz="1800" kern="1200">
+    <a:lvl7pPr marL="3665738" algn="l" defTabSz="610956" rtl="0" eaLnBrk="1" latinLnBrk="0" hangingPunct="1">
+      <a:defRPr sz="2400" kern="1200">
         <a:solidFill>
           <a:schemeClr val="tx1"/>
         </a:solidFill>
@@ -83,8 +83,8 @@
         <a:cs typeface="+mn-cs"/>
       </a:defRPr>
     </a:lvl7pPr>
-    <a:lvl8pPr marL="3200400" algn="l" defTabSz="457200" rtl="0" eaLnBrk="1" latinLnBrk="0" hangingPunct="1">
-      <a:defRPr sz="1800" kern="1200">
+    <a:lvl8pPr marL="4276695" algn="l" defTabSz="610956" rtl="0" eaLnBrk="1" latinLnBrk="0" hangingPunct="1">
+      <a:defRPr sz="2400" kern="1200">
         <a:solidFill>
           <a:schemeClr val="tx1"/>
         </a:solidFill>
@@ -93,8 +93,8 @@
         <a:cs typeface="+mn-cs"/>
       </a:defRPr>
     </a:lvl8pPr>
-    <a:lvl9pPr marL="3657600" algn="l" defTabSz="457200" rtl="0" eaLnBrk="1" latinLnBrk="0" hangingPunct="1">
-      <a:defRPr sz="1800" kern="1200">
+    <a:lvl9pPr marL="4887651" algn="l" defTabSz="610956" rtl="0" eaLnBrk="1" latinLnBrk="0" hangingPunct="1">
+      <a:defRPr sz="2400" kern="1200">
         <a:solidFill>
           <a:schemeClr val="tx1"/>
         </a:solidFill>
@@ -136,8 +136,8 @@
         </p:nvSpPr>
         <p:spPr>
           <a:xfrm>
-            <a:off x="514350" y="2840568"/>
-            <a:ext cx="5829300" cy="1960033"/>
+            <a:off x="720090" y="3976797"/>
+            <a:ext cx="8161020" cy="2744046"/>
           </a:xfrm>
         </p:spPr>
         <p:txBody>
@@ -164,8 +164,8 @@
         </p:nvSpPr>
         <p:spPr>
           <a:xfrm>
-            <a:off x="1028700" y="5181600"/>
-            <a:ext cx="4800600" cy="2336800"/>
+            <a:off x="1440180" y="7254242"/>
+            <a:ext cx="6720840" cy="3271520"/>
           </a:xfrm>
         </p:spPr>
         <p:txBody>
@@ -181,7 +181,7 @@
                 </a:solidFill>
               </a:defRPr>
             </a:lvl1pPr>
-            <a:lvl2pPr marL="457200" indent="0" algn="ctr">
+            <a:lvl2pPr marL="610956" indent="0" algn="ctr">
               <a:buNone/>
               <a:defRPr>
                 <a:solidFill>
@@ -191,7 +191,7 @@
                 </a:solidFill>
               </a:defRPr>
             </a:lvl2pPr>
-            <a:lvl3pPr marL="914400" indent="0" algn="ctr">
+            <a:lvl3pPr marL="1221913" indent="0" algn="ctr">
               <a:buNone/>
               <a:defRPr>
                 <a:solidFill>
@@ -201,7 +201,7 @@
                 </a:solidFill>
               </a:defRPr>
             </a:lvl3pPr>
-            <a:lvl4pPr marL="1371600" indent="0" algn="ctr">
+            <a:lvl4pPr marL="1832869" indent="0" algn="ctr">
               <a:buNone/>
               <a:defRPr>
                 <a:solidFill>
@@ -211,7 +211,7 @@
                 </a:solidFill>
               </a:defRPr>
             </a:lvl4pPr>
-            <a:lvl5pPr marL="1828800" indent="0" algn="ctr">
+            <a:lvl5pPr marL="2443825" indent="0" algn="ctr">
               <a:buNone/>
               <a:defRPr>
                 <a:solidFill>
@@ -221,7 +221,7 @@
                 </a:solidFill>
               </a:defRPr>
             </a:lvl5pPr>
-            <a:lvl6pPr marL="2286000" indent="0" algn="ctr">
+            <a:lvl6pPr marL="3054782" indent="0" algn="ctr">
               <a:buNone/>
               <a:defRPr>
                 <a:solidFill>
@@ -231,7 +231,7 @@
                 </a:solidFill>
               </a:defRPr>
             </a:lvl6pPr>
-            <a:lvl7pPr marL="2743200" indent="0" algn="ctr">
+            <a:lvl7pPr marL="3665738" indent="0" algn="ctr">
               <a:buNone/>
               <a:defRPr>
                 <a:solidFill>
@@ -241,7 +241,7 @@
                 </a:solidFill>
               </a:defRPr>
             </a:lvl7pPr>
-            <a:lvl8pPr marL="3200400" indent="0" algn="ctr">
+            <a:lvl8pPr marL="4276695" indent="0" algn="ctr">
               <a:buNone/>
               <a:defRPr>
                 <a:solidFill>
@@ -251,7 +251,7 @@
                 </a:solidFill>
               </a:defRPr>
             </a:lvl8pPr>
-            <a:lvl9pPr marL="3657600" indent="0" algn="ctr">
+            <a:lvl9pPr marL="4887651" indent="0" algn="ctr">
               <a:buNone/>
               <a:defRPr>
                 <a:solidFill>
@@ -286,9 +286,9 @@
           <a:bodyPr/>
           <a:lstStyle/>
           <a:p>
-            <a:fld id="{A6C25105-3586-1046-86F2-9CB9567013C8}" type="datetimeFigureOut">
-              <a:rPr lang="fr-FR" smtClean="0"/>
-              <a:t>23/07/13</a:t>
+            <a:fld id="{37D7CB3A-0DD3-D544-9607-0DC9BF6BC53B}" type="datetimeFigureOut">
+              <a:rPr lang="fr-FR" smtClean="0"/>
+              <a:t>24/07/13</a:t>
             </a:fld>
             <a:endParaRPr lang="fr-FR"/>
           </a:p>
@@ -328,7 +328,7 @@
           <a:bodyPr/>
           <a:lstStyle/>
           <a:p>
-            <a:fld id="{D1CAF028-CFC9-004F-B7B8-16274C11A5D8}" type="slidenum">
+            <a:fld id="{0BBF12E6-97CE-5D44-9388-F8219BD7B46A}" type="slidenum">
               <a:rPr lang="fr-FR" smtClean="0"/>
               <a:t>‹#›</a:t>
             </a:fld>
@@ -451,9 +451,9 @@
           <a:bodyPr/>
           <a:lstStyle/>
           <a:p>
-            <a:fld id="{A6C25105-3586-1046-86F2-9CB9567013C8}" type="datetimeFigureOut">
-              <a:rPr lang="fr-FR" smtClean="0"/>
-              <a:t>23/07/13</a:t>
+            <a:fld id="{37D7CB3A-0DD3-D544-9607-0DC9BF6BC53B}" type="datetimeFigureOut">
+              <a:rPr lang="fr-FR" smtClean="0"/>
+              <a:t>24/07/13</a:t>
             </a:fld>
             <a:endParaRPr lang="fr-FR"/>
           </a:p>
@@ -493,7 +493,7 @@
           <a:bodyPr/>
           <a:lstStyle/>
           <a:p>
-            <a:fld id="{D1CAF028-CFC9-004F-B7B8-16274C11A5D8}" type="slidenum">
+            <a:fld id="{0BBF12E6-97CE-5D44-9388-F8219BD7B46A}" type="slidenum">
               <a:rPr lang="fr-FR" smtClean="0"/>
               <a:t>‹#›</a:t>
             </a:fld>
@@ -538,8 +538,8 @@
         </p:nvSpPr>
         <p:spPr>
           <a:xfrm>
-            <a:off x="3729037" y="488951"/>
-            <a:ext cx="1157288" cy="10401300"/>
+            <a:off x="5220652" y="684532"/>
+            <a:ext cx="1620203" cy="14561820"/>
           </a:xfrm>
         </p:spPr>
         <p:txBody>
@@ -566,8 +566,8 @@
         </p:nvSpPr>
         <p:spPr>
           <a:xfrm>
-            <a:off x="257175" y="488951"/>
-            <a:ext cx="3357563" cy="10401300"/>
+            <a:off x="360047" y="684532"/>
+            <a:ext cx="4700588" cy="14561820"/>
           </a:xfrm>
         </p:spPr>
         <p:txBody>
@@ -626,9 +626,9 @@
           <a:bodyPr/>
           <a:lstStyle/>
           <a:p>
-            <a:fld id="{A6C25105-3586-1046-86F2-9CB9567013C8}" type="datetimeFigureOut">
-              <a:rPr lang="fr-FR" smtClean="0"/>
-              <a:t>23/07/13</a:t>
+            <a:fld id="{37D7CB3A-0DD3-D544-9607-0DC9BF6BC53B}" type="datetimeFigureOut">
+              <a:rPr lang="fr-FR" smtClean="0"/>
+              <a:t>24/07/13</a:t>
             </a:fld>
             <a:endParaRPr lang="fr-FR"/>
           </a:p>
@@ -668,7 +668,7 @@
           <a:bodyPr/>
           <a:lstStyle/>
           <a:p>
-            <a:fld id="{D1CAF028-CFC9-004F-B7B8-16274C11A5D8}" type="slidenum">
+            <a:fld id="{0BBF12E6-97CE-5D44-9388-F8219BD7B46A}" type="slidenum">
               <a:rPr lang="fr-FR" smtClean="0"/>
               <a:t>‹#›</a:t>
             </a:fld>
@@ -791,9 +791,9 @@
           <a:bodyPr/>
           <a:lstStyle/>
           <a:p>
-            <a:fld id="{A6C25105-3586-1046-86F2-9CB9567013C8}" type="datetimeFigureOut">
-              <a:rPr lang="fr-FR" smtClean="0"/>
-              <a:t>23/07/13</a:t>
+            <a:fld id="{37D7CB3A-0DD3-D544-9607-0DC9BF6BC53B}" type="datetimeFigureOut">
+              <a:rPr lang="fr-FR" smtClean="0"/>
+              <a:t>24/07/13</a:t>
             </a:fld>
             <a:endParaRPr lang="fr-FR"/>
           </a:p>
@@ -833,7 +833,7 @@
           <a:bodyPr/>
           <a:lstStyle/>
           <a:p>
-            <a:fld id="{D1CAF028-CFC9-004F-B7B8-16274C11A5D8}" type="slidenum">
+            <a:fld id="{0BBF12E6-97CE-5D44-9388-F8219BD7B46A}" type="slidenum">
               <a:rPr lang="fr-FR" smtClean="0"/>
               <a:t>‹#›</a:t>
             </a:fld>
@@ -878,15 +878,15 @@
         </p:nvSpPr>
         <p:spPr>
           <a:xfrm>
-            <a:off x="541735" y="5875867"/>
-            <a:ext cx="5829300" cy="1816100"/>
+            <a:off x="758429" y="8226215"/>
+            <a:ext cx="8161020" cy="2542540"/>
           </a:xfrm>
         </p:spPr>
         <p:txBody>
           <a:bodyPr anchor="t"/>
           <a:lstStyle>
             <a:lvl1pPr algn="l">
-              <a:defRPr sz="4000" b="1" cap="all"/>
+              <a:defRPr sz="5300" b="1" cap="all"/>
             </a:lvl1pPr>
           </a:lstStyle>
           <a:p>
@@ -910,8 +910,8 @@
         </p:nvSpPr>
         <p:spPr>
           <a:xfrm>
-            <a:off x="541735" y="3875618"/>
-            <a:ext cx="5829300" cy="2000249"/>
+            <a:off x="758429" y="5425866"/>
+            <a:ext cx="8161020" cy="2800348"/>
           </a:xfrm>
         </p:spPr>
         <p:txBody>
@@ -919,7 +919,7 @@
           <a:lstStyle>
             <a:lvl1pPr marL="0" indent="0">
               <a:buNone/>
-              <a:defRPr sz="2000">
+              <a:defRPr sz="2700">
                 <a:solidFill>
                   <a:schemeClr val="tx1">
                     <a:tint val="75000"/>
@@ -927,9 +927,9 @@
                 </a:solidFill>
               </a:defRPr>
             </a:lvl1pPr>
-            <a:lvl2pPr marL="457200" indent="0">
-              <a:buNone/>
-              <a:defRPr sz="1800">
+            <a:lvl2pPr marL="610956" indent="0">
+              <a:buNone/>
+              <a:defRPr sz="2400">
                 <a:solidFill>
                   <a:schemeClr val="tx1">
                     <a:tint val="75000"/>
@@ -937,9 +937,9 @@
                 </a:solidFill>
               </a:defRPr>
             </a:lvl2pPr>
-            <a:lvl3pPr marL="914400" indent="0">
-              <a:buNone/>
-              <a:defRPr sz="1600">
+            <a:lvl3pPr marL="1221913" indent="0">
+              <a:buNone/>
+              <a:defRPr sz="2100">
                 <a:solidFill>
                   <a:schemeClr val="tx1">
                     <a:tint val="75000"/>
@@ -947,9 +947,9 @@
                 </a:solidFill>
               </a:defRPr>
             </a:lvl3pPr>
-            <a:lvl4pPr marL="1371600" indent="0">
-              <a:buNone/>
-              <a:defRPr sz="1400">
+            <a:lvl4pPr marL="1832869" indent="0">
+              <a:buNone/>
+              <a:defRPr sz="1900">
                 <a:solidFill>
                   <a:schemeClr val="tx1">
                     <a:tint val="75000"/>
@@ -957,9 +957,9 @@
                 </a:solidFill>
               </a:defRPr>
             </a:lvl4pPr>
-            <a:lvl5pPr marL="1828800" indent="0">
-              <a:buNone/>
-              <a:defRPr sz="1400">
+            <a:lvl5pPr marL="2443825" indent="0">
+              <a:buNone/>
+              <a:defRPr sz="1900">
                 <a:solidFill>
                   <a:schemeClr val="tx1">
                     <a:tint val="75000"/>
@@ -967,9 +967,9 @@
                 </a:solidFill>
               </a:defRPr>
             </a:lvl5pPr>
-            <a:lvl6pPr marL="2286000" indent="0">
-              <a:buNone/>
-              <a:defRPr sz="1400">
+            <a:lvl6pPr marL="3054782" indent="0">
+              <a:buNone/>
+              <a:defRPr sz="1900">
                 <a:solidFill>
                   <a:schemeClr val="tx1">
                     <a:tint val="75000"/>
@@ -977,9 +977,9 @@
                 </a:solidFill>
               </a:defRPr>
             </a:lvl6pPr>
-            <a:lvl7pPr marL="2743200" indent="0">
-              <a:buNone/>
-              <a:defRPr sz="1400">
+            <a:lvl7pPr marL="3665738" indent="0">
+              <a:buNone/>
+              <a:defRPr sz="1900">
                 <a:solidFill>
                   <a:schemeClr val="tx1">
                     <a:tint val="75000"/>
@@ -987,9 +987,9 @@
                 </a:solidFill>
               </a:defRPr>
             </a:lvl7pPr>
-            <a:lvl8pPr marL="3200400" indent="0">
-              <a:buNone/>
-              <a:defRPr sz="1400">
+            <a:lvl8pPr marL="4276695" indent="0">
+              <a:buNone/>
+              <a:defRPr sz="1900">
                 <a:solidFill>
                   <a:schemeClr val="tx1">
                     <a:tint val="75000"/>
@@ -997,9 +997,9 @@
                 </a:solidFill>
               </a:defRPr>
             </a:lvl8pPr>
-            <a:lvl9pPr marL="3657600" indent="0">
-              <a:buNone/>
-              <a:defRPr sz="1400">
+            <a:lvl9pPr marL="4887651" indent="0">
+              <a:buNone/>
+              <a:defRPr sz="1900">
                 <a:solidFill>
                   <a:schemeClr val="tx1">
                     <a:tint val="75000"/>
@@ -1032,9 +1032,9 @@
           <a:bodyPr/>
           <a:lstStyle/>
           <a:p>
-            <a:fld id="{A6C25105-3586-1046-86F2-9CB9567013C8}" type="datetimeFigureOut">
-              <a:rPr lang="fr-FR" smtClean="0"/>
-              <a:t>23/07/13</a:t>
+            <a:fld id="{37D7CB3A-0DD3-D544-9607-0DC9BF6BC53B}" type="datetimeFigureOut">
+              <a:rPr lang="fr-FR" smtClean="0"/>
+              <a:t>24/07/13</a:t>
             </a:fld>
             <a:endParaRPr lang="fr-FR"/>
           </a:p>
@@ -1074,7 +1074,7 @@
           <a:bodyPr/>
           <a:lstStyle/>
           <a:p>
-            <a:fld id="{D1CAF028-CFC9-004F-B7B8-16274C11A5D8}" type="slidenum">
+            <a:fld id="{0BBF12E6-97CE-5D44-9388-F8219BD7B46A}" type="slidenum">
               <a:rPr lang="fr-FR" smtClean="0"/>
               <a:t>‹#›</a:t>
             </a:fld>
@@ -1142,39 +1142,39 @@
         </p:nvSpPr>
         <p:spPr>
           <a:xfrm>
-            <a:off x="257175" y="2844800"/>
-            <a:ext cx="2257425" cy="8045451"/>
+            <a:off x="360049" y="3982721"/>
+            <a:ext cx="3160395" cy="11263631"/>
           </a:xfrm>
         </p:spPr>
         <p:txBody>
           <a:bodyPr/>
           <a:lstStyle>
             <a:lvl1pPr>
-              <a:defRPr sz="2800"/>
+              <a:defRPr sz="3700"/>
             </a:lvl1pPr>
             <a:lvl2pPr>
-              <a:defRPr sz="2400"/>
+              <a:defRPr sz="3200"/>
             </a:lvl2pPr>
             <a:lvl3pPr>
-              <a:defRPr sz="2000"/>
+              <a:defRPr sz="2700"/>
             </a:lvl3pPr>
             <a:lvl4pPr>
-              <a:defRPr sz="1800"/>
+              <a:defRPr sz="2400"/>
             </a:lvl4pPr>
             <a:lvl5pPr>
-              <a:defRPr sz="1800"/>
+              <a:defRPr sz="2400"/>
             </a:lvl5pPr>
             <a:lvl6pPr>
-              <a:defRPr sz="1800"/>
+              <a:defRPr sz="2400"/>
             </a:lvl6pPr>
             <a:lvl7pPr>
-              <a:defRPr sz="1800"/>
+              <a:defRPr sz="2400"/>
             </a:lvl7pPr>
             <a:lvl8pPr>
-              <a:defRPr sz="1800"/>
+              <a:defRPr sz="2400"/>
             </a:lvl8pPr>
             <a:lvl9pPr>
-              <a:defRPr sz="1800"/>
+              <a:defRPr sz="2400"/>
             </a:lvl9pPr>
           </a:lstStyle>
           <a:p>
@@ -1227,39 +1227,39 @@
         </p:nvSpPr>
         <p:spPr>
           <a:xfrm>
-            <a:off x="2628900" y="2844800"/>
-            <a:ext cx="2257425" cy="8045451"/>
+            <a:off x="3680464" y="3982721"/>
+            <a:ext cx="3160395" cy="11263631"/>
           </a:xfrm>
         </p:spPr>
         <p:txBody>
           <a:bodyPr/>
           <a:lstStyle>
             <a:lvl1pPr>
-              <a:defRPr sz="2800"/>
+              <a:defRPr sz="3700"/>
             </a:lvl1pPr>
             <a:lvl2pPr>
-              <a:defRPr sz="2400"/>
+              <a:defRPr sz="3200"/>
             </a:lvl2pPr>
             <a:lvl3pPr>
-              <a:defRPr sz="2000"/>
+              <a:defRPr sz="2700"/>
             </a:lvl3pPr>
             <a:lvl4pPr>
-              <a:defRPr sz="1800"/>
+              <a:defRPr sz="2400"/>
             </a:lvl4pPr>
             <a:lvl5pPr>
-              <a:defRPr sz="1800"/>
+              <a:defRPr sz="2400"/>
             </a:lvl5pPr>
             <a:lvl6pPr>
-              <a:defRPr sz="1800"/>
+              <a:defRPr sz="2400"/>
             </a:lvl6pPr>
             <a:lvl7pPr>
-              <a:defRPr sz="1800"/>
+              <a:defRPr sz="2400"/>
             </a:lvl7pPr>
             <a:lvl8pPr>
-              <a:defRPr sz="1800"/>
+              <a:defRPr sz="2400"/>
             </a:lvl8pPr>
             <a:lvl9pPr>
-              <a:defRPr sz="1800"/>
+              <a:defRPr sz="2400"/>
             </a:lvl9pPr>
           </a:lstStyle>
           <a:p>
@@ -1315,9 +1315,9 @@
           <a:bodyPr/>
           <a:lstStyle/>
           <a:p>
-            <a:fld id="{A6C25105-3586-1046-86F2-9CB9567013C8}" type="datetimeFigureOut">
-              <a:rPr lang="fr-FR" smtClean="0"/>
-              <a:t>23/07/13</a:t>
+            <a:fld id="{37D7CB3A-0DD3-D544-9607-0DC9BF6BC53B}" type="datetimeFigureOut">
+              <a:rPr lang="fr-FR" smtClean="0"/>
+              <a:t>24/07/13</a:t>
             </a:fld>
             <a:endParaRPr lang="fr-FR"/>
           </a:p>
@@ -1357,7 +1357,7 @@
           <a:bodyPr/>
           <a:lstStyle/>
           <a:p>
-            <a:fld id="{D1CAF028-CFC9-004F-B7B8-16274C11A5D8}" type="slidenum">
+            <a:fld id="{0BBF12E6-97CE-5D44-9388-F8219BD7B46A}" type="slidenum">
               <a:rPr lang="fr-FR" smtClean="0"/>
               <a:t>‹#›</a:t>
             </a:fld>
@@ -1402,8 +1402,8 @@
         </p:nvSpPr>
         <p:spPr>
           <a:xfrm>
-            <a:off x="342900" y="366184"/>
-            <a:ext cx="6172200" cy="1524000"/>
+            <a:off x="480060" y="512657"/>
+            <a:ext cx="8641080" cy="2133600"/>
           </a:xfrm>
         </p:spPr>
         <p:txBody>
@@ -1434,8 +1434,8 @@
         </p:nvSpPr>
         <p:spPr>
           <a:xfrm>
-            <a:off x="342900" y="2046817"/>
-            <a:ext cx="3030141" cy="853016"/>
+            <a:off x="480061" y="2865544"/>
+            <a:ext cx="4242197" cy="1194223"/>
           </a:xfrm>
         </p:spPr>
         <p:txBody>
@@ -1443,39 +1443,39 @@
           <a:lstStyle>
             <a:lvl1pPr marL="0" indent="0">
               <a:buNone/>
+              <a:defRPr sz="3200" b="1"/>
+            </a:lvl1pPr>
+            <a:lvl2pPr marL="610956" indent="0">
+              <a:buNone/>
+              <a:defRPr sz="2700" b="1"/>
+            </a:lvl2pPr>
+            <a:lvl3pPr marL="1221913" indent="0">
+              <a:buNone/>
               <a:defRPr sz="2400" b="1"/>
-            </a:lvl1pPr>
-            <a:lvl2pPr marL="457200" indent="0">
-              <a:buNone/>
-              <a:defRPr sz="2000" b="1"/>
-            </a:lvl2pPr>
-            <a:lvl3pPr marL="914400" indent="0">
-              <a:buNone/>
-              <a:defRPr sz="1800" b="1"/>
             </a:lvl3pPr>
-            <a:lvl4pPr marL="1371600" indent="0">
-              <a:buNone/>
-              <a:defRPr sz="1600" b="1"/>
+            <a:lvl4pPr marL="1832869" indent="0">
+              <a:buNone/>
+              <a:defRPr sz="2100" b="1"/>
             </a:lvl4pPr>
-            <a:lvl5pPr marL="1828800" indent="0">
-              <a:buNone/>
-              <a:defRPr sz="1600" b="1"/>
+            <a:lvl5pPr marL="2443825" indent="0">
+              <a:buNone/>
+              <a:defRPr sz="2100" b="1"/>
             </a:lvl5pPr>
-            <a:lvl6pPr marL="2286000" indent="0">
-              <a:buNone/>
-              <a:defRPr sz="1600" b="1"/>
+            <a:lvl6pPr marL="3054782" indent="0">
+              <a:buNone/>
+              <a:defRPr sz="2100" b="1"/>
             </a:lvl6pPr>
-            <a:lvl7pPr marL="2743200" indent="0">
-              <a:buNone/>
-              <a:defRPr sz="1600" b="1"/>
+            <a:lvl7pPr marL="3665738" indent="0">
+              <a:buNone/>
+              <a:defRPr sz="2100" b="1"/>
             </a:lvl7pPr>
-            <a:lvl8pPr marL="3200400" indent="0">
-              <a:buNone/>
-              <a:defRPr sz="1600" b="1"/>
+            <a:lvl8pPr marL="4276695" indent="0">
+              <a:buNone/>
+              <a:defRPr sz="2100" b="1"/>
             </a:lvl8pPr>
-            <a:lvl9pPr marL="3657600" indent="0">
-              <a:buNone/>
-              <a:defRPr sz="1600" b="1"/>
+            <a:lvl9pPr marL="4887651" indent="0">
+              <a:buNone/>
+              <a:defRPr sz="2100" b="1"/>
             </a:lvl9pPr>
           </a:lstStyle>
           <a:p>
@@ -1499,39 +1499,39 @@
         </p:nvSpPr>
         <p:spPr>
           <a:xfrm>
-            <a:off x="342900" y="2899833"/>
-            <a:ext cx="3030141" cy="5268384"/>
+            <a:off x="480061" y="4059766"/>
+            <a:ext cx="4242197" cy="7375738"/>
           </a:xfrm>
         </p:spPr>
         <p:txBody>
           <a:bodyPr/>
           <a:lstStyle>
             <a:lvl1pPr>
-              <a:defRPr sz="2400"/>
+              <a:defRPr sz="3200"/>
             </a:lvl1pPr>
             <a:lvl2pPr>
-              <a:defRPr sz="2000"/>
+              <a:defRPr sz="2700"/>
             </a:lvl2pPr>
             <a:lvl3pPr>
-              <a:defRPr sz="1800"/>
+              <a:defRPr sz="2400"/>
             </a:lvl3pPr>
             <a:lvl4pPr>
-              <a:defRPr sz="1600"/>
+              <a:defRPr sz="2100"/>
             </a:lvl4pPr>
             <a:lvl5pPr>
-              <a:defRPr sz="1600"/>
+              <a:defRPr sz="2100"/>
             </a:lvl5pPr>
             <a:lvl6pPr>
-              <a:defRPr sz="1600"/>
+              <a:defRPr sz="2100"/>
             </a:lvl6pPr>
             <a:lvl7pPr>
-              <a:defRPr sz="1600"/>
+              <a:defRPr sz="2100"/>
             </a:lvl7pPr>
             <a:lvl8pPr>
-              <a:defRPr sz="1600"/>
+              <a:defRPr sz="2100"/>
             </a:lvl8pPr>
             <a:lvl9pPr>
-              <a:defRPr sz="1600"/>
+              <a:defRPr sz="2100"/>
             </a:lvl9pPr>
           </a:lstStyle>
           <a:p>
@@ -1584,8 +1584,8 @@
         </p:nvSpPr>
         <p:spPr>
           <a:xfrm>
-            <a:off x="3483769" y="2046817"/>
-            <a:ext cx="3031331" cy="853016"/>
+            <a:off x="4877280" y="2865544"/>
+            <a:ext cx="4243863" cy="1194223"/>
           </a:xfrm>
         </p:spPr>
         <p:txBody>
@@ -1593,39 +1593,39 @@
           <a:lstStyle>
             <a:lvl1pPr marL="0" indent="0">
               <a:buNone/>
+              <a:defRPr sz="3200" b="1"/>
+            </a:lvl1pPr>
+            <a:lvl2pPr marL="610956" indent="0">
+              <a:buNone/>
+              <a:defRPr sz="2700" b="1"/>
+            </a:lvl2pPr>
+            <a:lvl3pPr marL="1221913" indent="0">
+              <a:buNone/>
               <a:defRPr sz="2400" b="1"/>
-            </a:lvl1pPr>
-            <a:lvl2pPr marL="457200" indent="0">
-              <a:buNone/>
-              <a:defRPr sz="2000" b="1"/>
-            </a:lvl2pPr>
-            <a:lvl3pPr marL="914400" indent="0">
-              <a:buNone/>
-              <a:defRPr sz="1800" b="1"/>
             </a:lvl3pPr>
-            <a:lvl4pPr marL="1371600" indent="0">
-              <a:buNone/>
-              <a:defRPr sz="1600" b="1"/>
+            <a:lvl4pPr marL="1832869" indent="0">
+              <a:buNone/>
+              <a:defRPr sz="2100" b="1"/>
             </a:lvl4pPr>
-            <a:lvl5pPr marL="1828800" indent="0">
-              <a:buNone/>
-              <a:defRPr sz="1600" b="1"/>
+            <a:lvl5pPr marL="2443825" indent="0">
+              <a:buNone/>
+              <a:defRPr sz="2100" b="1"/>
             </a:lvl5pPr>
-            <a:lvl6pPr marL="2286000" indent="0">
-              <a:buNone/>
-              <a:defRPr sz="1600" b="1"/>
+            <a:lvl6pPr marL="3054782" indent="0">
+              <a:buNone/>
+              <a:defRPr sz="2100" b="1"/>
             </a:lvl6pPr>
-            <a:lvl7pPr marL="2743200" indent="0">
-              <a:buNone/>
-              <a:defRPr sz="1600" b="1"/>
+            <a:lvl7pPr marL="3665738" indent="0">
+              <a:buNone/>
+              <a:defRPr sz="2100" b="1"/>
             </a:lvl7pPr>
-            <a:lvl8pPr marL="3200400" indent="0">
-              <a:buNone/>
-              <a:defRPr sz="1600" b="1"/>
+            <a:lvl8pPr marL="4276695" indent="0">
+              <a:buNone/>
+              <a:defRPr sz="2100" b="1"/>
             </a:lvl8pPr>
-            <a:lvl9pPr marL="3657600" indent="0">
-              <a:buNone/>
-              <a:defRPr sz="1600" b="1"/>
+            <a:lvl9pPr marL="4887651" indent="0">
+              <a:buNone/>
+              <a:defRPr sz="2100" b="1"/>
             </a:lvl9pPr>
           </a:lstStyle>
           <a:p>
@@ -1649,39 +1649,39 @@
         </p:nvSpPr>
         <p:spPr>
           <a:xfrm>
-            <a:off x="3483769" y="2899833"/>
-            <a:ext cx="3031331" cy="5268384"/>
+            <a:off x="4877280" y="4059766"/>
+            <a:ext cx="4243863" cy="7375738"/>
           </a:xfrm>
         </p:spPr>
         <p:txBody>
           <a:bodyPr/>
           <a:lstStyle>
             <a:lvl1pPr>
-              <a:defRPr sz="2400"/>
+              <a:defRPr sz="3200"/>
             </a:lvl1pPr>
             <a:lvl2pPr>
-              <a:defRPr sz="2000"/>
+              <a:defRPr sz="2700"/>
             </a:lvl2pPr>
             <a:lvl3pPr>
-              <a:defRPr sz="1800"/>
+              <a:defRPr sz="2400"/>
             </a:lvl3pPr>
             <a:lvl4pPr>
-              <a:defRPr sz="1600"/>
+              <a:defRPr sz="2100"/>
             </a:lvl4pPr>
             <a:lvl5pPr>
-              <a:defRPr sz="1600"/>
+              <a:defRPr sz="2100"/>
             </a:lvl5pPr>
             <a:lvl6pPr>
-              <a:defRPr sz="1600"/>
+              <a:defRPr sz="2100"/>
             </a:lvl6pPr>
             <a:lvl7pPr>
-              <a:defRPr sz="1600"/>
+              <a:defRPr sz="2100"/>
             </a:lvl7pPr>
             <a:lvl8pPr>
-              <a:defRPr sz="1600"/>
+              <a:defRPr sz="2100"/>
             </a:lvl8pPr>
             <a:lvl9pPr>
-              <a:defRPr sz="1600"/>
+              <a:defRPr sz="2100"/>
             </a:lvl9pPr>
           </a:lstStyle>
           <a:p>
@@ -1737,9 +1737,9 @@
           <a:bodyPr/>
           <a:lstStyle/>
           <a:p>
-            <a:fld id="{A6C25105-3586-1046-86F2-9CB9567013C8}" type="datetimeFigureOut">
-              <a:rPr lang="fr-FR" smtClean="0"/>
-              <a:t>23/07/13</a:t>
+            <a:fld id="{37D7CB3A-0DD3-D544-9607-0DC9BF6BC53B}" type="datetimeFigureOut">
+              <a:rPr lang="fr-FR" smtClean="0"/>
+              <a:t>24/07/13</a:t>
             </a:fld>
             <a:endParaRPr lang="fr-FR"/>
           </a:p>
@@ -1779,7 +1779,7 @@
           <a:bodyPr/>
           <a:lstStyle/>
           <a:p>
-            <a:fld id="{D1CAF028-CFC9-004F-B7B8-16274C11A5D8}" type="slidenum">
+            <a:fld id="{0BBF12E6-97CE-5D44-9388-F8219BD7B46A}" type="slidenum">
               <a:rPr lang="fr-FR" smtClean="0"/>
               <a:t>‹#›</a:t>
             </a:fld>
@@ -1850,9 +1850,9 @@
           <a:bodyPr/>
           <a:lstStyle/>
           <a:p>
-            <a:fld id="{A6C25105-3586-1046-86F2-9CB9567013C8}" type="datetimeFigureOut">
-              <a:rPr lang="fr-FR" smtClean="0"/>
-              <a:t>23/07/13</a:t>
+            <a:fld id="{37D7CB3A-0DD3-D544-9607-0DC9BF6BC53B}" type="datetimeFigureOut">
+              <a:rPr lang="fr-FR" smtClean="0"/>
+              <a:t>24/07/13</a:t>
             </a:fld>
             <a:endParaRPr lang="fr-FR"/>
           </a:p>
@@ -1892,7 +1892,7 @@
           <a:bodyPr/>
           <a:lstStyle/>
           <a:p>
-            <a:fld id="{D1CAF028-CFC9-004F-B7B8-16274C11A5D8}" type="slidenum">
+            <a:fld id="{0BBF12E6-97CE-5D44-9388-F8219BD7B46A}" type="slidenum">
               <a:rPr lang="fr-FR" smtClean="0"/>
               <a:t>‹#›</a:t>
             </a:fld>
@@ -1940,9 +1940,9 @@
           <a:bodyPr/>
           <a:lstStyle/>
           <a:p>
-            <a:fld id="{A6C25105-3586-1046-86F2-9CB9567013C8}" type="datetimeFigureOut">
-              <a:rPr lang="fr-FR" smtClean="0"/>
-              <a:t>23/07/13</a:t>
+            <a:fld id="{37D7CB3A-0DD3-D544-9607-0DC9BF6BC53B}" type="datetimeFigureOut">
+              <a:rPr lang="fr-FR" smtClean="0"/>
+              <a:t>24/07/13</a:t>
             </a:fld>
             <a:endParaRPr lang="fr-FR"/>
           </a:p>
@@ -1982,7 +1982,7 @@
           <a:bodyPr/>
           <a:lstStyle/>
           <a:p>
-            <a:fld id="{D1CAF028-CFC9-004F-B7B8-16274C11A5D8}" type="slidenum">
+            <a:fld id="{0BBF12E6-97CE-5D44-9388-F8219BD7B46A}" type="slidenum">
               <a:rPr lang="fr-FR" smtClean="0"/>
               <a:t>‹#›</a:t>
             </a:fld>
@@ -2027,15 +2027,15 @@
         </p:nvSpPr>
         <p:spPr>
           <a:xfrm>
-            <a:off x="342900" y="364067"/>
-            <a:ext cx="2256235" cy="1549400"/>
+            <a:off x="480064" y="509695"/>
+            <a:ext cx="3158729" cy="2169159"/>
           </a:xfrm>
         </p:spPr>
         <p:txBody>
           <a:bodyPr anchor="b"/>
           <a:lstStyle>
             <a:lvl1pPr algn="l">
-              <a:defRPr sz="2000" b="1"/>
+              <a:defRPr sz="2700" b="1"/>
             </a:lvl1pPr>
           </a:lstStyle>
           <a:p>
@@ -2059,39 +2059,39 @@
         </p:nvSpPr>
         <p:spPr>
           <a:xfrm>
-            <a:off x="2681287" y="364067"/>
-            <a:ext cx="3833813" cy="7804151"/>
+            <a:off x="3753805" y="509696"/>
+            <a:ext cx="5367338" cy="10925812"/>
           </a:xfrm>
         </p:spPr>
         <p:txBody>
           <a:bodyPr/>
           <a:lstStyle>
             <a:lvl1pPr>
-              <a:defRPr sz="3200"/>
+              <a:defRPr sz="4300"/>
             </a:lvl1pPr>
             <a:lvl2pPr>
-              <a:defRPr sz="2800"/>
+              <a:defRPr sz="3700"/>
             </a:lvl2pPr>
             <a:lvl3pPr>
-              <a:defRPr sz="2400"/>
+              <a:defRPr sz="3200"/>
             </a:lvl3pPr>
             <a:lvl4pPr>
-              <a:defRPr sz="2000"/>
+              <a:defRPr sz="2700"/>
             </a:lvl4pPr>
             <a:lvl5pPr>
-              <a:defRPr sz="2000"/>
+              <a:defRPr sz="2700"/>
             </a:lvl5pPr>
             <a:lvl6pPr>
-              <a:defRPr sz="2000"/>
+              <a:defRPr sz="2700"/>
             </a:lvl6pPr>
             <a:lvl7pPr>
-              <a:defRPr sz="2000"/>
+              <a:defRPr sz="2700"/>
             </a:lvl7pPr>
             <a:lvl8pPr>
-              <a:defRPr sz="2000"/>
+              <a:defRPr sz="2700"/>
             </a:lvl8pPr>
             <a:lvl9pPr>
-              <a:defRPr sz="2000"/>
+              <a:defRPr sz="2700"/>
             </a:lvl9pPr>
           </a:lstStyle>
           <a:p>
@@ -2144,8 +2144,8 @@
         </p:nvSpPr>
         <p:spPr>
           <a:xfrm>
-            <a:off x="342900" y="1913467"/>
-            <a:ext cx="2256235" cy="6254751"/>
+            <a:off x="480064" y="2678856"/>
+            <a:ext cx="3158729" cy="8756651"/>
           </a:xfrm>
         </p:spPr>
         <p:txBody>
@@ -2153,39 +2153,39 @@
           <a:lstStyle>
             <a:lvl1pPr marL="0" indent="0">
               <a:buNone/>
-              <a:defRPr sz="1400"/>
+              <a:defRPr sz="1900"/>
             </a:lvl1pPr>
-            <a:lvl2pPr marL="457200" indent="0">
+            <a:lvl2pPr marL="610956" indent="0">
+              <a:buNone/>
+              <a:defRPr sz="1600"/>
+            </a:lvl2pPr>
+            <a:lvl3pPr marL="1221913" indent="0">
+              <a:buNone/>
+              <a:defRPr sz="1300"/>
+            </a:lvl3pPr>
+            <a:lvl4pPr marL="1832869" indent="0">
               <a:buNone/>
               <a:defRPr sz="1200"/>
-            </a:lvl2pPr>
-            <a:lvl3pPr marL="914400" indent="0">
-              <a:buNone/>
-              <a:defRPr sz="1000"/>
-            </a:lvl3pPr>
-            <a:lvl4pPr marL="1371600" indent="0">
-              <a:buNone/>
-              <a:defRPr sz="900"/>
             </a:lvl4pPr>
-            <a:lvl5pPr marL="1828800" indent="0">
-              <a:buNone/>
-              <a:defRPr sz="900"/>
+            <a:lvl5pPr marL="2443825" indent="0">
+              <a:buNone/>
+              <a:defRPr sz="1200"/>
             </a:lvl5pPr>
-            <a:lvl6pPr marL="2286000" indent="0">
-              <a:buNone/>
-              <a:defRPr sz="900"/>
+            <a:lvl6pPr marL="3054782" indent="0">
+              <a:buNone/>
+              <a:defRPr sz="1200"/>
             </a:lvl6pPr>
-            <a:lvl7pPr marL="2743200" indent="0">
-              <a:buNone/>
-              <a:defRPr sz="900"/>
+            <a:lvl7pPr marL="3665738" indent="0">
+              <a:buNone/>
+              <a:defRPr sz="1200"/>
             </a:lvl7pPr>
-            <a:lvl8pPr marL="3200400" indent="0">
-              <a:buNone/>
-              <a:defRPr sz="900"/>
+            <a:lvl8pPr marL="4276695" indent="0">
+              <a:buNone/>
+              <a:defRPr sz="1200"/>
             </a:lvl8pPr>
-            <a:lvl9pPr marL="3657600" indent="0">
-              <a:buNone/>
-              <a:defRPr sz="900"/>
+            <a:lvl9pPr marL="4887651" indent="0">
+              <a:buNone/>
+              <a:defRPr sz="1200"/>
             </a:lvl9pPr>
           </a:lstStyle>
           <a:p>
@@ -2212,9 +2212,9 @@
           <a:bodyPr/>
           <a:lstStyle/>
           <a:p>
-            <a:fld id="{A6C25105-3586-1046-86F2-9CB9567013C8}" type="datetimeFigureOut">
-              <a:rPr lang="fr-FR" smtClean="0"/>
-              <a:t>23/07/13</a:t>
+            <a:fld id="{37D7CB3A-0DD3-D544-9607-0DC9BF6BC53B}" type="datetimeFigureOut">
+              <a:rPr lang="fr-FR" smtClean="0"/>
+              <a:t>24/07/13</a:t>
             </a:fld>
             <a:endParaRPr lang="fr-FR"/>
           </a:p>
@@ -2254,7 +2254,7 @@
           <a:bodyPr/>
           <a:lstStyle/>
           <a:p>
-            <a:fld id="{D1CAF028-CFC9-004F-B7B8-16274C11A5D8}" type="slidenum">
+            <a:fld id="{0BBF12E6-97CE-5D44-9388-F8219BD7B46A}" type="slidenum">
               <a:rPr lang="fr-FR" smtClean="0"/>
               <a:t>‹#›</a:t>
             </a:fld>
@@ -2299,15 +2299,15 @@
         </p:nvSpPr>
         <p:spPr>
           <a:xfrm>
-            <a:off x="1344216" y="6400800"/>
-            <a:ext cx="4114800" cy="755651"/>
+            <a:off x="1881902" y="8961121"/>
+            <a:ext cx="5760720" cy="1057912"/>
           </a:xfrm>
         </p:spPr>
         <p:txBody>
           <a:bodyPr anchor="b"/>
           <a:lstStyle>
             <a:lvl1pPr algn="l">
-              <a:defRPr sz="2000" b="1"/>
+              <a:defRPr sz="2700" b="1"/>
             </a:lvl1pPr>
           </a:lstStyle>
           <a:p>
@@ -2331,8 +2331,8 @@
         </p:nvSpPr>
         <p:spPr>
           <a:xfrm>
-            <a:off x="1344216" y="817033"/>
-            <a:ext cx="4114800" cy="5486400"/>
+            <a:off x="1881902" y="1143846"/>
+            <a:ext cx="5760720" cy="7680960"/>
           </a:xfrm>
         </p:spPr>
         <p:txBody>
@@ -2340,39 +2340,39 @@
           <a:lstStyle>
             <a:lvl1pPr marL="0" indent="0">
               <a:buNone/>
+              <a:defRPr sz="4300"/>
+            </a:lvl1pPr>
+            <a:lvl2pPr marL="610956" indent="0">
+              <a:buNone/>
+              <a:defRPr sz="3700"/>
+            </a:lvl2pPr>
+            <a:lvl3pPr marL="1221913" indent="0">
+              <a:buNone/>
               <a:defRPr sz="3200"/>
-            </a:lvl1pPr>
-            <a:lvl2pPr marL="457200" indent="0">
-              <a:buNone/>
-              <a:defRPr sz="2800"/>
-            </a:lvl2pPr>
-            <a:lvl3pPr marL="914400" indent="0">
-              <a:buNone/>
-              <a:defRPr sz="2400"/>
             </a:lvl3pPr>
-            <a:lvl4pPr marL="1371600" indent="0">
-              <a:buNone/>
-              <a:defRPr sz="2000"/>
+            <a:lvl4pPr marL="1832869" indent="0">
+              <a:buNone/>
+              <a:defRPr sz="2700"/>
             </a:lvl4pPr>
-            <a:lvl5pPr marL="1828800" indent="0">
-              <a:buNone/>
-              <a:defRPr sz="2000"/>
+            <a:lvl5pPr marL="2443825" indent="0">
+              <a:buNone/>
+              <a:defRPr sz="2700"/>
             </a:lvl5pPr>
-            <a:lvl6pPr marL="2286000" indent="0">
-              <a:buNone/>
-              <a:defRPr sz="2000"/>
+            <a:lvl6pPr marL="3054782" indent="0">
+              <a:buNone/>
+              <a:defRPr sz="2700"/>
             </a:lvl6pPr>
-            <a:lvl7pPr marL="2743200" indent="0">
-              <a:buNone/>
-              <a:defRPr sz="2000"/>
+            <a:lvl7pPr marL="3665738" indent="0">
+              <a:buNone/>
+              <a:defRPr sz="2700"/>
             </a:lvl7pPr>
-            <a:lvl8pPr marL="3200400" indent="0">
-              <a:buNone/>
-              <a:defRPr sz="2000"/>
+            <a:lvl8pPr marL="4276695" indent="0">
+              <a:buNone/>
+              <a:defRPr sz="2700"/>
             </a:lvl8pPr>
-            <a:lvl9pPr marL="3657600" indent="0">
-              <a:buNone/>
-              <a:defRPr sz="2000"/>
+            <a:lvl9pPr marL="4887651" indent="0">
+              <a:buNone/>
+              <a:defRPr sz="2700"/>
             </a:lvl9pPr>
           </a:lstStyle>
           <a:p>
@@ -2392,8 +2392,8 @@
         </p:nvSpPr>
         <p:spPr>
           <a:xfrm>
-            <a:off x="1344216" y="7156451"/>
-            <a:ext cx="4114800" cy="1073149"/>
+            <a:off x="1881902" y="10019033"/>
+            <a:ext cx="5760720" cy="1502408"/>
           </a:xfrm>
         </p:spPr>
         <p:txBody>
@@ -2401,39 +2401,39 @@
           <a:lstStyle>
             <a:lvl1pPr marL="0" indent="0">
               <a:buNone/>
-              <a:defRPr sz="1400"/>
+              <a:defRPr sz="1900"/>
             </a:lvl1pPr>
-            <a:lvl2pPr marL="457200" indent="0">
+            <a:lvl2pPr marL="610956" indent="0">
+              <a:buNone/>
+              <a:defRPr sz="1600"/>
+            </a:lvl2pPr>
+            <a:lvl3pPr marL="1221913" indent="0">
+              <a:buNone/>
+              <a:defRPr sz="1300"/>
+            </a:lvl3pPr>
+            <a:lvl4pPr marL="1832869" indent="0">
               <a:buNone/>
               <a:defRPr sz="1200"/>
-            </a:lvl2pPr>
-            <a:lvl3pPr marL="914400" indent="0">
-              <a:buNone/>
-              <a:defRPr sz="1000"/>
-            </a:lvl3pPr>
-            <a:lvl4pPr marL="1371600" indent="0">
-              <a:buNone/>
-              <a:defRPr sz="900"/>
             </a:lvl4pPr>
-            <a:lvl5pPr marL="1828800" indent="0">
-              <a:buNone/>
-              <a:defRPr sz="900"/>
+            <a:lvl5pPr marL="2443825" indent="0">
+              <a:buNone/>
+              <a:defRPr sz="1200"/>
             </a:lvl5pPr>
-            <a:lvl6pPr marL="2286000" indent="0">
-              <a:buNone/>
-              <a:defRPr sz="900"/>
+            <a:lvl6pPr marL="3054782" indent="0">
+              <a:buNone/>
+              <a:defRPr sz="1200"/>
             </a:lvl6pPr>
-            <a:lvl7pPr marL="2743200" indent="0">
-              <a:buNone/>
-              <a:defRPr sz="900"/>
+            <a:lvl7pPr marL="3665738" indent="0">
+              <a:buNone/>
+              <a:defRPr sz="1200"/>
             </a:lvl7pPr>
-            <a:lvl8pPr marL="3200400" indent="0">
-              <a:buNone/>
-              <a:defRPr sz="900"/>
+            <a:lvl8pPr marL="4276695" indent="0">
+              <a:buNone/>
+              <a:defRPr sz="1200"/>
             </a:lvl8pPr>
-            <a:lvl9pPr marL="3657600" indent="0">
-              <a:buNone/>
-              <a:defRPr sz="900"/>
+            <a:lvl9pPr marL="4887651" indent="0">
+              <a:buNone/>
+              <a:defRPr sz="1200"/>
             </a:lvl9pPr>
           </a:lstStyle>
           <a:p>
@@ -2460,9 +2460,9 @@
           <a:bodyPr/>
           <a:lstStyle/>
           <a:p>
-            <a:fld id="{A6C25105-3586-1046-86F2-9CB9567013C8}" type="datetimeFigureOut">
-              <a:rPr lang="fr-FR" smtClean="0"/>
-              <a:t>23/07/13</a:t>
+            <a:fld id="{37D7CB3A-0DD3-D544-9607-0DC9BF6BC53B}" type="datetimeFigureOut">
+              <a:rPr lang="fr-FR" smtClean="0"/>
+              <a:t>24/07/13</a:t>
             </a:fld>
             <a:endParaRPr lang="fr-FR"/>
           </a:p>
@@ -2502,7 +2502,7 @@
           <a:bodyPr/>
           <a:lstStyle/>
           <a:p>
-            <a:fld id="{D1CAF028-CFC9-004F-B7B8-16274C11A5D8}" type="slidenum">
+            <a:fld id="{0BBF12E6-97CE-5D44-9388-F8219BD7B46A}" type="slidenum">
               <a:rPr lang="fr-FR" smtClean="0"/>
               <a:t>‹#›</a:t>
             </a:fld>
@@ -2552,15 +2552,15 @@
         </p:nvSpPr>
         <p:spPr>
           <a:xfrm>
-            <a:off x="342900" y="366184"/>
-            <a:ext cx="6172200" cy="1524000"/>
+            <a:off x="480060" y="512657"/>
+            <a:ext cx="8641080" cy="2133600"/>
           </a:xfrm>
           <a:prstGeom prst="rect">
             <a:avLst/>
           </a:prstGeom>
         </p:spPr>
         <p:txBody>
-          <a:bodyPr vert="horz" lIns="91440" tIns="45720" rIns="91440" bIns="45720" rtlCol="0" anchor="ctr">
+          <a:bodyPr vert="horz" lIns="122191" tIns="61096" rIns="122191" bIns="61096" rtlCol="0" anchor="ctr">
             <a:normAutofit/>
           </a:bodyPr>
           <a:lstStyle/>
@@ -2585,15 +2585,15 @@
         </p:nvSpPr>
         <p:spPr>
           <a:xfrm>
-            <a:off x="342900" y="2133601"/>
-            <a:ext cx="6172200" cy="6034617"/>
+            <a:off x="480060" y="2987043"/>
+            <a:ext cx="8641080" cy="8448464"/>
           </a:xfrm>
           <a:prstGeom prst="rect">
             <a:avLst/>
           </a:prstGeom>
         </p:spPr>
         <p:txBody>
-          <a:bodyPr vert="horz" lIns="91440" tIns="45720" rIns="91440" bIns="45720" rtlCol="0">
+          <a:bodyPr vert="horz" lIns="122191" tIns="61096" rIns="122191" bIns="61096" rtlCol="0">
             <a:normAutofit/>
           </a:bodyPr>
           <a:lstStyle/>
@@ -2647,18 +2647,18 @@
         </p:nvSpPr>
         <p:spPr>
           <a:xfrm>
-            <a:off x="342900" y="8475134"/>
-            <a:ext cx="1600200" cy="486833"/>
+            <a:off x="480060" y="11865189"/>
+            <a:ext cx="2240280" cy="681567"/>
           </a:xfrm>
           <a:prstGeom prst="rect">
             <a:avLst/>
           </a:prstGeom>
         </p:spPr>
         <p:txBody>
-          <a:bodyPr vert="horz" lIns="91440" tIns="45720" rIns="91440" bIns="45720" rtlCol="0" anchor="ctr"/>
+          <a:bodyPr vert="horz" lIns="122191" tIns="61096" rIns="122191" bIns="61096" rtlCol="0" anchor="ctr"/>
           <a:lstStyle>
             <a:lvl1pPr algn="l">
-              <a:defRPr sz="1200">
+              <a:defRPr sz="1600">
                 <a:solidFill>
                   <a:schemeClr val="tx1">
                     <a:tint val="75000"/>
@@ -2668,9 +2668,9 @@
             </a:lvl1pPr>
           </a:lstStyle>
           <a:p>
-            <a:fld id="{A6C25105-3586-1046-86F2-9CB9567013C8}" type="datetimeFigureOut">
-              <a:rPr lang="fr-FR" smtClean="0"/>
-              <a:t>23/07/13</a:t>
+            <a:fld id="{37D7CB3A-0DD3-D544-9607-0DC9BF6BC53B}" type="datetimeFigureOut">
+              <a:rPr lang="fr-FR" smtClean="0"/>
+              <a:t>24/07/13</a:t>
             </a:fld>
             <a:endParaRPr lang="fr-FR"/>
           </a:p>
@@ -2688,18 +2688,18 @@
         </p:nvSpPr>
         <p:spPr>
           <a:xfrm>
-            <a:off x="2343150" y="8475134"/>
-            <a:ext cx="2171700" cy="486833"/>
+            <a:off x="3280410" y="11865189"/>
+            <a:ext cx="3040380" cy="681567"/>
           </a:xfrm>
           <a:prstGeom prst="rect">
             <a:avLst/>
           </a:prstGeom>
         </p:spPr>
         <p:txBody>
-          <a:bodyPr vert="horz" lIns="91440" tIns="45720" rIns="91440" bIns="45720" rtlCol="0" anchor="ctr"/>
+          <a:bodyPr vert="horz" lIns="122191" tIns="61096" rIns="122191" bIns="61096" rtlCol="0" anchor="ctr"/>
           <a:lstStyle>
             <a:lvl1pPr algn="ctr">
-              <a:defRPr sz="1200">
+              <a:defRPr sz="1600">
                 <a:solidFill>
                   <a:schemeClr val="tx1">
                     <a:tint val="75000"/>
@@ -2725,18 +2725,18 @@
         </p:nvSpPr>
         <p:spPr>
           <a:xfrm>
-            <a:off x="4914900" y="8475134"/>
-            <a:ext cx="1600200" cy="486833"/>
+            <a:off x="6880860" y="11865189"/>
+            <a:ext cx="2240280" cy="681567"/>
           </a:xfrm>
           <a:prstGeom prst="rect">
             <a:avLst/>
           </a:prstGeom>
         </p:spPr>
         <p:txBody>
-          <a:bodyPr vert="horz" lIns="91440" tIns="45720" rIns="91440" bIns="45720" rtlCol="0" anchor="ctr"/>
+          <a:bodyPr vert="horz" lIns="122191" tIns="61096" rIns="122191" bIns="61096" rtlCol="0" anchor="ctr"/>
           <a:lstStyle>
             <a:lvl1pPr algn="r">
-              <a:defRPr sz="1200">
+              <a:defRPr sz="1600">
                 <a:solidFill>
                   <a:schemeClr val="tx1">
                     <a:tint val="75000"/>
@@ -2746,7 +2746,7 @@
             </a:lvl1pPr>
           </a:lstStyle>
           <a:p>
-            <a:fld id="{D1CAF028-CFC9-004F-B7B8-16274C11A5D8}" type="slidenum">
+            <a:fld id="{0BBF12E6-97CE-5D44-9388-F8219BD7B46A}" type="slidenum">
               <a:rPr lang="fr-FR" smtClean="0"/>
               <a:t>‹#›</a:t>
             </a:fld>
@@ -2772,12 +2772,12 @@
   </p:sldLayoutIdLst>
   <p:txStyles>
     <p:titleStyle>
-      <a:lvl1pPr algn="ctr" defTabSz="457200" rtl="0" eaLnBrk="1" latinLnBrk="0" hangingPunct="1">
+      <a:lvl1pPr algn="ctr" defTabSz="610956" rtl="0" eaLnBrk="1" latinLnBrk="0" hangingPunct="1">
         <a:spcBef>
           <a:spcPct val="0"/>
         </a:spcBef>
         <a:buNone/>
-        <a:defRPr sz="4400" kern="1200">
+        <a:defRPr sz="5900" kern="1200">
           <a:solidFill>
             <a:schemeClr val="tx1"/>
           </a:solidFill>
@@ -2788,7 +2788,37 @@
       </a:lvl1pPr>
     </p:titleStyle>
     <p:bodyStyle>
-      <a:lvl1pPr marL="342900" indent="-342900" algn="l" defTabSz="457200" rtl="0" eaLnBrk="1" latinLnBrk="0" hangingPunct="1">
+      <a:lvl1pPr marL="458217" indent="-458217" algn="l" defTabSz="610956" rtl="0" eaLnBrk="1" latinLnBrk="0" hangingPunct="1">
+        <a:spcBef>
+          <a:spcPct val="20000"/>
+        </a:spcBef>
+        <a:buFont typeface="Arial"/>
+        <a:buChar char="•"/>
+        <a:defRPr sz="4300" kern="1200">
+          <a:solidFill>
+            <a:schemeClr val="tx1"/>
+          </a:solidFill>
+          <a:latin typeface="+mn-lt"/>
+          <a:ea typeface="+mn-ea"/>
+          <a:cs typeface="+mn-cs"/>
+        </a:defRPr>
+      </a:lvl1pPr>
+      <a:lvl2pPr marL="992804" indent="-381848" algn="l" defTabSz="610956" rtl="0" eaLnBrk="1" latinLnBrk="0" hangingPunct="1">
+        <a:spcBef>
+          <a:spcPct val="20000"/>
+        </a:spcBef>
+        <a:buFont typeface="Arial"/>
+        <a:buChar char="–"/>
+        <a:defRPr sz="3700" kern="1200">
+          <a:solidFill>
+            <a:schemeClr val="tx1"/>
+          </a:solidFill>
+          <a:latin typeface="+mn-lt"/>
+          <a:ea typeface="+mn-ea"/>
+          <a:cs typeface="+mn-cs"/>
+        </a:defRPr>
+      </a:lvl2pPr>
+      <a:lvl3pPr marL="1527391" indent="-305478" algn="l" defTabSz="610956" rtl="0" eaLnBrk="1" latinLnBrk="0" hangingPunct="1">
         <a:spcBef>
           <a:spcPct val="20000"/>
         </a:spcBef>
@@ -2802,44 +2832,14 @@
           <a:ea typeface="+mn-ea"/>
           <a:cs typeface="+mn-cs"/>
         </a:defRPr>
-      </a:lvl1pPr>
-      <a:lvl2pPr marL="742950" indent="-285750" algn="l" defTabSz="457200" rtl="0" eaLnBrk="1" latinLnBrk="0" hangingPunct="1">
+      </a:lvl3pPr>
+      <a:lvl4pPr marL="2138347" indent="-305478" algn="l" defTabSz="610956" rtl="0" eaLnBrk="1" latinLnBrk="0" hangingPunct="1">
         <a:spcBef>
           <a:spcPct val="20000"/>
         </a:spcBef>
         <a:buFont typeface="Arial"/>
         <a:buChar char="–"/>
-        <a:defRPr sz="2800" kern="1200">
-          <a:solidFill>
-            <a:schemeClr val="tx1"/>
-          </a:solidFill>
-          <a:latin typeface="+mn-lt"/>
-          <a:ea typeface="+mn-ea"/>
-          <a:cs typeface="+mn-cs"/>
-        </a:defRPr>
-      </a:lvl2pPr>
-      <a:lvl3pPr marL="1143000" indent="-228600" algn="l" defTabSz="457200" rtl="0" eaLnBrk="1" latinLnBrk="0" hangingPunct="1">
-        <a:spcBef>
-          <a:spcPct val="20000"/>
-        </a:spcBef>
-        <a:buFont typeface="Arial"/>
-        <a:buChar char="•"/>
-        <a:defRPr sz="2400" kern="1200">
-          <a:solidFill>
-            <a:schemeClr val="tx1"/>
-          </a:solidFill>
-          <a:latin typeface="+mn-lt"/>
-          <a:ea typeface="+mn-ea"/>
-          <a:cs typeface="+mn-cs"/>
-        </a:defRPr>
-      </a:lvl3pPr>
-      <a:lvl4pPr marL="1600200" indent="-228600" algn="l" defTabSz="457200" rtl="0" eaLnBrk="1" latinLnBrk="0" hangingPunct="1">
-        <a:spcBef>
-          <a:spcPct val="20000"/>
-        </a:spcBef>
-        <a:buFont typeface="Arial"/>
-        <a:buChar char="–"/>
-        <a:defRPr sz="2000" kern="1200">
+        <a:defRPr sz="2700" kern="1200">
           <a:solidFill>
             <a:schemeClr val="tx1"/>
           </a:solidFill>
@@ -2848,13 +2848,13 @@
           <a:cs typeface="+mn-cs"/>
         </a:defRPr>
       </a:lvl4pPr>
-      <a:lvl5pPr marL="2057400" indent="-228600" algn="l" defTabSz="457200" rtl="0" eaLnBrk="1" latinLnBrk="0" hangingPunct="1">
+      <a:lvl5pPr marL="2749304" indent="-305478" algn="l" defTabSz="610956" rtl="0" eaLnBrk="1" latinLnBrk="0" hangingPunct="1">
         <a:spcBef>
           <a:spcPct val="20000"/>
         </a:spcBef>
         <a:buFont typeface="Arial"/>
         <a:buChar char="»"/>
-        <a:defRPr sz="2000" kern="1200">
+        <a:defRPr sz="2700" kern="1200">
           <a:solidFill>
             <a:schemeClr val="tx1"/>
           </a:solidFill>
@@ -2863,13 +2863,13 @@
           <a:cs typeface="+mn-cs"/>
         </a:defRPr>
       </a:lvl5pPr>
-      <a:lvl6pPr marL="2514600" indent="-228600" algn="l" defTabSz="457200" rtl="0" eaLnBrk="1" latinLnBrk="0" hangingPunct="1">
+      <a:lvl6pPr marL="3360260" indent="-305478" algn="l" defTabSz="610956" rtl="0" eaLnBrk="1" latinLnBrk="0" hangingPunct="1">
         <a:spcBef>
           <a:spcPct val="20000"/>
         </a:spcBef>
         <a:buFont typeface="Arial"/>
         <a:buChar char="•"/>
-        <a:defRPr sz="2000" kern="1200">
+        <a:defRPr sz="2700" kern="1200">
           <a:solidFill>
             <a:schemeClr val="tx1"/>
           </a:solidFill>
@@ -2878,13 +2878,13 @@
           <a:cs typeface="+mn-cs"/>
         </a:defRPr>
       </a:lvl6pPr>
-      <a:lvl7pPr marL="2971800" indent="-228600" algn="l" defTabSz="457200" rtl="0" eaLnBrk="1" latinLnBrk="0" hangingPunct="1">
+      <a:lvl7pPr marL="3971216" indent="-305478" algn="l" defTabSz="610956" rtl="0" eaLnBrk="1" latinLnBrk="0" hangingPunct="1">
         <a:spcBef>
           <a:spcPct val="20000"/>
         </a:spcBef>
         <a:buFont typeface="Arial"/>
         <a:buChar char="•"/>
-        <a:defRPr sz="2000" kern="1200">
+        <a:defRPr sz="2700" kern="1200">
           <a:solidFill>
             <a:schemeClr val="tx1"/>
           </a:solidFill>
@@ -2893,13 +2893,13 @@
           <a:cs typeface="+mn-cs"/>
         </a:defRPr>
       </a:lvl7pPr>
-      <a:lvl8pPr marL="3429000" indent="-228600" algn="l" defTabSz="457200" rtl="0" eaLnBrk="1" latinLnBrk="0" hangingPunct="1">
+      <a:lvl8pPr marL="4582173" indent="-305478" algn="l" defTabSz="610956" rtl="0" eaLnBrk="1" latinLnBrk="0" hangingPunct="1">
         <a:spcBef>
           <a:spcPct val="20000"/>
         </a:spcBef>
         <a:buFont typeface="Arial"/>
         <a:buChar char="•"/>
-        <a:defRPr sz="2000" kern="1200">
+        <a:defRPr sz="2700" kern="1200">
           <a:solidFill>
             <a:schemeClr val="tx1"/>
           </a:solidFill>
@@ -2908,13 +2908,13 @@
           <a:cs typeface="+mn-cs"/>
         </a:defRPr>
       </a:lvl8pPr>
-      <a:lvl9pPr marL="3886200" indent="-228600" algn="l" defTabSz="457200" rtl="0" eaLnBrk="1" latinLnBrk="0" hangingPunct="1">
+      <a:lvl9pPr marL="5193129" indent="-305478" algn="l" defTabSz="610956" rtl="0" eaLnBrk="1" latinLnBrk="0" hangingPunct="1">
         <a:spcBef>
           <a:spcPct val="20000"/>
         </a:spcBef>
         <a:buFont typeface="Arial"/>
         <a:buChar char="•"/>
-        <a:defRPr sz="2000" kern="1200">
+        <a:defRPr sz="2700" kern="1200">
           <a:solidFill>
             <a:schemeClr val="tx1"/>
           </a:solidFill>
@@ -2928,8 +2928,8 @@
       <a:defPPr>
         <a:defRPr lang="fr-FR"/>
       </a:defPPr>
-      <a:lvl1pPr marL="0" algn="l" defTabSz="457200" rtl="0" eaLnBrk="1" latinLnBrk="0" hangingPunct="1">
-        <a:defRPr sz="1800" kern="1200">
+      <a:lvl1pPr marL="0" algn="l" defTabSz="610956" rtl="0" eaLnBrk="1" latinLnBrk="0" hangingPunct="1">
+        <a:defRPr sz="2400" kern="1200">
           <a:solidFill>
             <a:schemeClr val="tx1"/>
           </a:solidFill>
@@ -2938,8 +2938,8 @@
           <a:cs typeface="+mn-cs"/>
         </a:defRPr>
       </a:lvl1pPr>
-      <a:lvl2pPr marL="457200" algn="l" defTabSz="457200" rtl="0" eaLnBrk="1" latinLnBrk="0" hangingPunct="1">
-        <a:defRPr sz="1800" kern="1200">
+      <a:lvl2pPr marL="610956" algn="l" defTabSz="610956" rtl="0" eaLnBrk="1" latinLnBrk="0" hangingPunct="1">
+        <a:defRPr sz="2400" kern="1200">
           <a:solidFill>
             <a:schemeClr val="tx1"/>
           </a:solidFill>
@@ -2948,8 +2948,8 @@
           <a:cs typeface="+mn-cs"/>
         </a:defRPr>
       </a:lvl2pPr>
-      <a:lvl3pPr marL="914400" algn="l" defTabSz="457200" rtl="0" eaLnBrk="1" latinLnBrk="0" hangingPunct="1">
-        <a:defRPr sz="1800" kern="1200">
+      <a:lvl3pPr marL="1221913" algn="l" defTabSz="610956" rtl="0" eaLnBrk="1" latinLnBrk="0" hangingPunct="1">
+        <a:defRPr sz="2400" kern="1200">
           <a:solidFill>
             <a:schemeClr val="tx1"/>
           </a:solidFill>
@@ -2958,8 +2958,8 @@
           <a:cs typeface="+mn-cs"/>
         </a:defRPr>
       </a:lvl3pPr>
-      <a:lvl4pPr marL="1371600" algn="l" defTabSz="457200" rtl="0" eaLnBrk="1" latinLnBrk="0" hangingPunct="1">
-        <a:defRPr sz="1800" kern="1200">
+      <a:lvl4pPr marL="1832869" algn="l" defTabSz="610956" rtl="0" eaLnBrk="1" latinLnBrk="0" hangingPunct="1">
+        <a:defRPr sz="2400" kern="1200">
           <a:solidFill>
             <a:schemeClr val="tx1"/>
           </a:solidFill>
@@ -2968,8 +2968,8 @@
           <a:cs typeface="+mn-cs"/>
         </a:defRPr>
       </a:lvl4pPr>
-      <a:lvl5pPr marL="1828800" algn="l" defTabSz="457200" rtl="0" eaLnBrk="1" latinLnBrk="0" hangingPunct="1">
-        <a:defRPr sz="1800" kern="1200">
+      <a:lvl5pPr marL="2443825" algn="l" defTabSz="610956" rtl="0" eaLnBrk="1" latinLnBrk="0" hangingPunct="1">
+        <a:defRPr sz="2400" kern="1200">
           <a:solidFill>
             <a:schemeClr val="tx1"/>
           </a:solidFill>
@@ -2978,8 +2978,8 @@
           <a:cs typeface="+mn-cs"/>
         </a:defRPr>
       </a:lvl5pPr>
-      <a:lvl6pPr marL="2286000" algn="l" defTabSz="457200" rtl="0" eaLnBrk="1" latinLnBrk="0" hangingPunct="1">
-        <a:defRPr sz="1800" kern="1200">
+      <a:lvl6pPr marL="3054782" algn="l" defTabSz="610956" rtl="0" eaLnBrk="1" latinLnBrk="0" hangingPunct="1">
+        <a:defRPr sz="2400" kern="1200">
           <a:solidFill>
             <a:schemeClr val="tx1"/>
           </a:solidFill>
@@ -2988,8 +2988,8 @@
           <a:cs typeface="+mn-cs"/>
         </a:defRPr>
       </a:lvl6pPr>
-      <a:lvl7pPr marL="2743200" algn="l" defTabSz="457200" rtl="0" eaLnBrk="1" latinLnBrk="0" hangingPunct="1">
-        <a:defRPr sz="1800" kern="1200">
+      <a:lvl7pPr marL="3665738" algn="l" defTabSz="610956" rtl="0" eaLnBrk="1" latinLnBrk="0" hangingPunct="1">
+        <a:defRPr sz="2400" kern="1200">
           <a:solidFill>
             <a:schemeClr val="tx1"/>
           </a:solidFill>
@@ -2998,8 +2998,8 @@
           <a:cs typeface="+mn-cs"/>
         </a:defRPr>
       </a:lvl7pPr>
-      <a:lvl8pPr marL="3200400" algn="l" defTabSz="457200" rtl="0" eaLnBrk="1" latinLnBrk="0" hangingPunct="1">
-        <a:defRPr sz="1800" kern="1200">
+      <a:lvl8pPr marL="4276695" algn="l" defTabSz="610956" rtl="0" eaLnBrk="1" latinLnBrk="0" hangingPunct="1">
+        <a:defRPr sz="2400" kern="1200">
           <a:solidFill>
             <a:schemeClr val="tx1"/>
           </a:solidFill>
@@ -3008,8 +3008,8 @@
           <a:cs typeface="+mn-cs"/>
         </a:defRPr>
       </a:lvl8pPr>
-      <a:lvl9pPr marL="3657600" algn="l" defTabSz="457200" rtl="0" eaLnBrk="1" latinLnBrk="0" hangingPunct="1">
-        <a:defRPr sz="1800" kern="1200">
+      <a:lvl9pPr marL="4887651" algn="l" defTabSz="610956" rtl="0" eaLnBrk="1" latinLnBrk="0" hangingPunct="1">
+        <a:defRPr sz="2400" kern="1200">
           <a:solidFill>
             <a:schemeClr val="tx1"/>
           </a:solidFill>
@@ -3042,7 +3042,7 @@
       </p:grpSpPr>
       <p:pic>
         <p:nvPicPr>
-          <p:cNvPr id="6" name="Image 5" descr="gcomp_MD_MDFT_neop.pdf"/>
+          <p:cNvPr id="4" name="Image 3" descr="gcomp_MD_MDFT_neop.pdf"/>
           <p:cNvPicPr>
             <a:picLocks noChangeAspect="1"/>
           </p:cNvPicPr>
@@ -3068,8 +3068,8 @@
         </mc:AlternateContent>
         <p:spPr>
           <a:xfrm>
-            <a:off x="0" y="4409184"/>
-            <a:ext cx="6858000" cy="4963416"/>
+            <a:off x="0" y="7672737"/>
+            <a:ext cx="7086600" cy="5128863"/>
           </a:xfrm>
           <a:prstGeom prst="rect">
             <a:avLst/>
@@ -3078,7 +3078,7 @@
       </p:pic>
       <p:pic>
         <p:nvPicPr>
-          <p:cNvPr id="7" name="Image 6" descr="vmdscene.tga"/>
+          <p:cNvPr id="5" name="Image 4"/>
           <p:cNvPicPr>
             <a:picLocks noChangeAspect="1"/>
           </p:cNvPicPr>
@@ -3092,8 +3092,32 @@
         </p:blipFill>
         <p:spPr>
           <a:xfrm>
-            <a:off x="76200" y="-609600"/>
-            <a:ext cx="6139093" cy="5029200"/>
+            <a:off x="0" y="1918903"/>
+            <a:ext cx="7086600" cy="5777297"/>
+          </a:xfrm>
+          <a:prstGeom prst="rect">
+            <a:avLst/>
+          </a:prstGeom>
+        </p:spPr>
+      </p:pic>
+      <p:pic>
+        <p:nvPicPr>
+          <p:cNvPr id="7" name="Image 6"/>
+          <p:cNvPicPr>
+            <a:picLocks noChangeAspect="1"/>
+          </p:cNvPicPr>
+          <p:nvPr/>
+        </p:nvPicPr>
+        <p:blipFill>
+          <a:blip r:embed="rId5"/>
+          <a:stretch>
+            <a:fillRect/>
+          </a:stretch>
+        </p:blipFill>
+        <p:spPr>
+          <a:xfrm>
+            <a:off x="0" y="1918903"/>
+            <a:ext cx="1709911" cy="2047241"/>
           </a:xfrm>
           <a:prstGeom prst="rect">
             <a:avLst/>

</xml_diff>

<commit_message>
correction of fig of neopentane to remove cadre of legend and correction of caption
</commit_message>
<xml_diff>
--- a/neopentane_g_and_dens.pptx
+++ b/neopentane_g_and_dens.pptx
@@ -288,6 +288,7 @@
           <a:p>
             <a:fld id="{37D7CB3A-0DD3-D544-9607-0DC9BF6BC53B}" type="datetimeFigureOut">
               <a:rPr lang="fr-FR" smtClean="0"/>
+              <a:pPr/>
               <a:t>24/07/13</a:t>
             </a:fld>
             <a:endParaRPr lang="fr-FR"/>
@@ -330,6 +331,7 @@
           <a:p>
             <a:fld id="{0BBF12E6-97CE-5D44-9388-F8219BD7B46A}" type="slidenum">
               <a:rPr lang="fr-FR" smtClean="0"/>
+              <a:pPr/>
               <a:t>‹#›</a:t>
             </a:fld>
             <a:endParaRPr lang="fr-FR"/>
@@ -453,6 +455,7 @@
           <a:p>
             <a:fld id="{37D7CB3A-0DD3-D544-9607-0DC9BF6BC53B}" type="datetimeFigureOut">
               <a:rPr lang="fr-FR" smtClean="0"/>
+              <a:pPr/>
               <a:t>24/07/13</a:t>
             </a:fld>
             <a:endParaRPr lang="fr-FR"/>
@@ -495,6 +498,7 @@
           <a:p>
             <a:fld id="{0BBF12E6-97CE-5D44-9388-F8219BD7B46A}" type="slidenum">
               <a:rPr lang="fr-FR" smtClean="0"/>
+              <a:pPr/>
               <a:t>‹#›</a:t>
             </a:fld>
             <a:endParaRPr lang="fr-FR"/>
@@ -628,6 +632,7 @@
           <a:p>
             <a:fld id="{37D7CB3A-0DD3-D544-9607-0DC9BF6BC53B}" type="datetimeFigureOut">
               <a:rPr lang="fr-FR" smtClean="0"/>
+              <a:pPr/>
               <a:t>24/07/13</a:t>
             </a:fld>
             <a:endParaRPr lang="fr-FR"/>
@@ -670,6 +675,7 @@
           <a:p>
             <a:fld id="{0BBF12E6-97CE-5D44-9388-F8219BD7B46A}" type="slidenum">
               <a:rPr lang="fr-FR" smtClean="0"/>
+              <a:pPr/>
               <a:t>‹#›</a:t>
             </a:fld>
             <a:endParaRPr lang="fr-FR"/>
@@ -793,6 +799,7 @@
           <a:p>
             <a:fld id="{37D7CB3A-0DD3-D544-9607-0DC9BF6BC53B}" type="datetimeFigureOut">
               <a:rPr lang="fr-FR" smtClean="0"/>
+              <a:pPr/>
               <a:t>24/07/13</a:t>
             </a:fld>
             <a:endParaRPr lang="fr-FR"/>
@@ -835,6 +842,7 @@
           <a:p>
             <a:fld id="{0BBF12E6-97CE-5D44-9388-F8219BD7B46A}" type="slidenum">
               <a:rPr lang="fr-FR" smtClean="0"/>
+              <a:pPr/>
               <a:t>‹#›</a:t>
             </a:fld>
             <a:endParaRPr lang="fr-FR"/>
@@ -1034,6 +1042,7 @@
           <a:p>
             <a:fld id="{37D7CB3A-0DD3-D544-9607-0DC9BF6BC53B}" type="datetimeFigureOut">
               <a:rPr lang="fr-FR" smtClean="0"/>
+              <a:pPr/>
               <a:t>24/07/13</a:t>
             </a:fld>
             <a:endParaRPr lang="fr-FR"/>
@@ -1076,6 +1085,7 @@
           <a:p>
             <a:fld id="{0BBF12E6-97CE-5D44-9388-F8219BD7B46A}" type="slidenum">
               <a:rPr lang="fr-FR" smtClean="0"/>
+              <a:pPr/>
               <a:t>‹#›</a:t>
             </a:fld>
             <a:endParaRPr lang="fr-FR"/>
@@ -1317,6 +1327,7 @@
           <a:p>
             <a:fld id="{37D7CB3A-0DD3-D544-9607-0DC9BF6BC53B}" type="datetimeFigureOut">
               <a:rPr lang="fr-FR" smtClean="0"/>
+              <a:pPr/>
               <a:t>24/07/13</a:t>
             </a:fld>
             <a:endParaRPr lang="fr-FR"/>
@@ -1359,6 +1370,7 @@
           <a:p>
             <a:fld id="{0BBF12E6-97CE-5D44-9388-F8219BD7B46A}" type="slidenum">
               <a:rPr lang="fr-FR" smtClean="0"/>
+              <a:pPr/>
               <a:t>‹#›</a:t>
             </a:fld>
             <a:endParaRPr lang="fr-FR"/>
@@ -1739,6 +1751,7 @@
           <a:p>
             <a:fld id="{37D7CB3A-0DD3-D544-9607-0DC9BF6BC53B}" type="datetimeFigureOut">
               <a:rPr lang="fr-FR" smtClean="0"/>
+              <a:pPr/>
               <a:t>24/07/13</a:t>
             </a:fld>
             <a:endParaRPr lang="fr-FR"/>
@@ -1781,6 +1794,7 @@
           <a:p>
             <a:fld id="{0BBF12E6-97CE-5D44-9388-F8219BD7B46A}" type="slidenum">
               <a:rPr lang="fr-FR" smtClean="0"/>
+              <a:pPr/>
               <a:t>‹#›</a:t>
             </a:fld>
             <a:endParaRPr lang="fr-FR"/>
@@ -1852,6 +1866,7 @@
           <a:p>
             <a:fld id="{37D7CB3A-0DD3-D544-9607-0DC9BF6BC53B}" type="datetimeFigureOut">
               <a:rPr lang="fr-FR" smtClean="0"/>
+              <a:pPr/>
               <a:t>24/07/13</a:t>
             </a:fld>
             <a:endParaRPr lang="fr-FR"/>
@@ -1894,6 +1909,7 @@
           <a:p>
             <a:fld id="{0BBF12E6-97CE-5D44-9388-F8219BD7B46A}" type="slidenum">
               <a:rPr lang="fr-FR" smtClean="0"/>
+              <a:pPr/>
               <a:t>‹#›</a:t>
             </a:fld>
             <a:endParaRPr lang="fr-FR"/>
@@ -1942,6 +1958,7 @@
           <a:p>
             <a:fld id="{37D7CB3A-0DD3-D544-9607-0DC9BF6BC53B}" type="datetimeFigureOut">
               <a:rPr lang="fr-FR" smtClean="0"/>
+              <a:pPr/>
               <a:t>24/07/13</a:t>
             </a:fld>
             <a:endParaRPr lang="fr-FR"/>
@@ -1984,6 +2001,7 @@
           <a:p>
             <a:fld id="{0BBF12E6-97CE-5D44-9388-F8219BD7B46A}" type="slidenum">
               <a:rPr lang="fr-FR" smtClean="0"/>
+              <a:pPr/>
               <a:t>‹#›</a:t>
             </a:fld>
             <a:endParaRPr lang="fr-FR"/>
@@ -2214,6 +2232,7 @@
           <a:p>
             <a:fld id="{37D7CB3A-0DD3-D544-9607-0DC9BF6BC53B}" type="datetimeFigureOut">
               <a:rPr lang="fr-FR" smtClean="0"/>
+              <a:pPr/>
               <a:t>24/07/13</a:t>
             </a:fld>
             <a:endParaRPr lang="fr-FR"/>
@@ -2256,6 +2275,7 @@
           <a:p>
             <a:fld id="{0BBF12E6-97CE-5D44-9388-F8219BD7B46A}" type="slidenum">
               <a:rPr lang="fr-FR" smtClean="0"/>
+              <a:pPr/>
               <a:t>‹#›</a:t>
             </a:fld>
             <a:endParaRPr lang="fr-FR"/>
@@ -2462,6 +2482,7 @@
           <a:p>
             <a:fld id="{37D7CB3A-0DD3-D544-9607-0DC9BF6BC53B}" type="datetimeFigureOut">
               <a:rPr lang="fr-FR" smtClean="0"/>
+              <a:pPr/>
               <a:t>24/07/13</a:t>
             </a:fld>
             <a:endParaRPr lang="fr-FR"/>
@@ -2504,6 +2525,7 @@
           <a:p>
             <a:fld id="{0BBF12E6-97CE-5D44-9388-F8219BD7B46A}" type="slidenum">
               <a:rPr lang="fr-FR" smtClean="0"/>
+              <a:pPr/>
               <a:t>‹#›</a:t>
             </a:fld>
             <a:endParaRPr lang="fr-FR"/>
@@ -2670,6 +2692,7 @@
           <a:p>
             <a:fld id="{37D7CB3A-0DD3-D544-9607-0DC9BF6BC53B}" type="datetimeFigureOut">
               <a:rPr lang="fr-FR" smtClean="0"/>
+              <a:pPr/>
               <a:t>24/07/13</a:t>
             </a:fld>
             <a:endParaRPr lang="fr-FR"/>
@@ -2748,6 +2771,7 @@
           <a:p>
             <a:fld id="{0BBF12E6-97CE-5D44-9388-F8219BD7B46A}" type="slidenum">
               <a:rPr lang="fr-FR" smtClean="0"/>
+              <a:pPr/>
               <a:t>‹#›</a:t>
             </a:fld>
             <a:endParaRPr lang="fr-FR"/>
@@ -3042,42 +3066,6 @@
       </p:grpSpPr>
       <p:pic>
         <p:nvPicPr>
-          <p:cNvPr id="4" name="Image 3" descr="gcomp_MD_MDFT_neop.pdf"/>
-          <p:cNvPicPr>
-            <a:picLocks noChangeAspect="1"/>
-          </p:cNvPicPr>
-          <p:nvPr/>
-        </p:nvPicPr>
-        <mc:AlternateContent>
-          <mc:Choice xmlns:ma="http://schemas.microsoft.com/office/mac/drawingml/2008/main" Requires="ma">
-            <p:blipFill>
-              <a:blip r:embed="rId2"/>
-              <a:stretch>
-                <a:fillRect/>
-              </a:stretch>
-            </p:blipFill>
-          </mc:Choice>
-          <mc:Fallback>
-            <p:blipFill>
-              <a:blip r:embed="rId3"/>
-              <a:stretch>
-                <a:fillRect/>
-              </a:stretch>
-            </p:blipFill>
-          </mc:Fallback>
-        </mc:AlternateContent>
-        <p:spPr>
-          <a:xfrm>
-            <a:off x="0" y="7672737"/>
-            <a:ext cx="7086600" cy="5128863"/>
-          </a:xfrm>
-          <a:prstGeom prst="rect">
-            <a:avLst/>
-          </a:prstGeom>
-        </p:spPr>
-      </p:pic>
-      <p:pic>
-        <p:nvPicPr>
           <p:cNvPr id="5" name="Image 4"/>
           <p:cNvPicPr>
             <a:picLocks noChangeAspect="1"/>
@@ -3085,7 +3073,7 @@
           <p:nvPr/>
         </p:nvPicPr>
         <p:blipFill>
-          <a:blip r:embed="rId4"/>
+          <a:blip r:embed="rId2"/>
           <a:stretch>
             <a:fillRect/>
           </a:stretch>
@@ -3109,7 +3097,7 @@
           <p:nvPr/>
         </p:nvPicPr>
         <p:blipFill>
-          <a:blip r:embed="rId5"/>
+          <a:blip r:embed="rId3"/>
           <a:stretch>
             <a:fillRect/>
           </a:stretch>
@@ -3118,6 +3106,42 @@
           <a:xfrm>
             <a:off x="0" y="1918903"/>
             <a:ext cx="1709911" cy="2047241"/>
+          </a:xfrm>
+          <a:prstGeom prst="rect">
+            <a:avLst/>
+          </a:prstGeom>
+        </p:spPr>
+      </p:pic>
+      <p:pic>
+        <p:nvPicPr>
+          <p:cNvPr id="6" name="Image 5" descr="gcomp_MD_MDFT_neop.pdf"/>
+          <p:cNvPicPr>
+            <a:picLocks noChangeAspect="1"/>
+          </p:cNvPicPr>
+          <p:nvPr/>
+        </p:nvPicPr>
+        <mc:AlternateContent>
+          <mc:Choice xmlns:ma="http://schemas.microsoft.com/office/mac/drawingml/2008/main" Requires="ma">
+            <p:blipFill>
+              <a:blip r:embed="rId4"/>
+              <a:stretch>
+                <a:fillRect/>
+              </a:stretch>
+            </p:blipFill>
+          </mc:Choice>
+          <mc:Fallback>
+            <p:blipFill>
+              <a:blip r:embed="rId5"/>
+              <a:stretch>
+                <a:fillRect/>
+              </a:stretch>
+            </p:blipFill>
+          </mc:Fallback>
+        </mc:AlternateContent>
+        <p:spPr>
+          <a:xfrm>
+            <a:off x="0" y="7672736"/>
+            <a:ext cx="7086600" cy="5128863"/>
           </a:xfrm>
           <a:prstGeom prst="rect">
             <a:avLst/>

</xml_diff>